<commit_message>
Updating s6 slides handout
</commit_message>
<xml_diff>
--- a/s6/slides/s6.pptx
+++ b/s6/slides/s6.pptx
@@ -5,15 +5,12 @@
     <p:sldMasterId id="2147483648" r:id="rId1"/>
   </p:sldMasterIdLst>
   <p:notesMasterIdLst>
-    <p:notesMasterId r:id="rId8"/>
+    <p:notesMasterId r:id="rId5"/>
   </p:notesMasterIdLst>
   <p:sldIdLst>
-    <p:sldId id="301" r:id="rId2"/>
-    <p:sldId id="299" r:id="rId3"/>
-    <p:sldId id="286" r:id="rId4"/>
-    <p:sldId id="293" r:id="rId5"/>
-    <p:sldId id="297" r:id="rId6"/>
-    <p:sldId id="296" r:id="rId7"/>
+    <p:sldId id="286" r:id="rId2"/>
+    <p:sldId id="293" r:id="rId3"/>
+    <p:sldId id="297" r:id="rId4"/>
   </p:sldIdLst>
   <p:sldSz cx="12192000" cy="6858000"/>
   <p:notesSz cx="6858000" cy="9144000"/>
@@ -117,12 +114,9 @@
       <p14:sectionLst xmlns:p14="http://schemas.microsoft.com/office/powerpoint/2010/main">
         <p14:section name="Default Section" id="{BCC25E8B-7885-9143-B6A6-C663038D90BB}">
           <p14:sldIdLst>
-            <p14:sldId id="301"/>
-            <p14:sldId id="299"/>
             <p14:sldId id="286"/>
             <p14:sldId id="293"/>
             <p14:sldId id="297"/>
-            <p14:sldId id="296"/>
           </p14:sldIdLst>
         </p14:section>
       </p14:sectionLst>
@@ -216,7 +210,7 @@
           <a:p>
             <a:fld id="{EBD6F028-2067-3740-AA48-A91E93570B1D}" type="datetimeFigureOut">
               <a:rPr lang="en-US" smtClean="0"/>
-              <a:t>11/3/19</a:t>
+              <a:t>10/24/2020</a:t>
             </a:fld>
             <a:endParaRPr lang="en-US"/>
           </a:p>
@@ -557,90 +551,6 @@
     </p:spTree>
     <p:extLst>
       <p:ext uri="{BB962C8B-B14F-4D97-AF65-F5344CB8AC3E}">
-        <p14:creationId xmlns:p14="http://schemas.microsoft.com/office/powerpoint/2010/main" val="239482731"/>
-      </p:ext>
-    </p:extLst>
-  </p:cSld>
-  <p:clrMapOvr>
-    <a:masterClrMapping/>
-  </p:clrMapOvr>
-</p:notes>
-</file>
-
-<file path=ppt/notesSlides/notesSlide2.xml><?xml version="1.0" encoding="utf-8"?>
-<p:notes xmlns:a="http://schemas.openxmlformats.org/drawingml/2006/main" xmlns:r="http://schemas.openxmlformats.org/officeDocument/2006/relationships" xmlns:p="http://schemas.openxmlformats.org/presentationml/2006/main">
-  <p:cSld>
-    <p:spTree>
-      <p:nvGrpSpPr>
-        <p:cNvPr id="1" name=""/>
-        <p:cNvGrpSpPr/>
-        <p:nvPr/>
-      </p:nvGrpSpPr>
-      <p:grpSpPr>
-        <a:xfrm>
-          <a:off x="0" y="0"/>
-          <a:ext cx="0" cy="0"/>
-          <a:chOff x="0" y="0"/>
-          <a:chExt cx="0" cy="0"/>
-        </a:xfrm>
-      </p:grpSpPr>
-      <p:sp>
-        <p:nvSpPr>
-          <p:cNvPr id="2" name="Slide Image Placeholder 1"/>
-          <p:cNvSpPr>
-            <a:spLocks noGrp="1" noRot="1" noChangeAspect="1"/>
-          </p:cNvSpPr>
-          <p:nvPr>
-            <p:ph type="sldImg"/>
-          </p:nvPr>
-        </p:nvSpPr>
-        <p:spPr/>
-      </p:sp>
-      <p:sp>
-        <p:nvSpPr>
-          <p:cNvPr id="3" name="Notes Placeholder 2"/>
-          <p:cNvSpPr>
-            <a:spLocks noGrp="1"/>
-          </p:cNvSpPr>
-          <p:nvPr>
-            <p:ph type="body" idx="1"/>
-          </p:nvPr>
-        </p:nvSpPr>
-        <p:spPr/>
-        <p:txBody>
-          <a:bodyPr/>
-          <a:lstStyle/>
-          <a:p>
-            <a:endParaRPr lang="en-US"/>
-          </a:p>
-        </p:txBody>
-      </p:sp>
-      <p:sp>
-        <p:nvSpPr>
-          <p:cNvPr id="4" name="Slide Number Placeholder 3"/>
-          <p:cNvSpPr>
-            <a:spLocks noGrp="1"/>
-          </p:cNvSpPr>
-          <p:nvPr>
-            <p:ph type="sldNum" sz="quarter" idx="10"/>
-          </p:nvPr>
-        </p:nvSpPr>
-        <p:spPr/>
-        <p:txBody>
-          <a:bodyPr/>
-          <a:lstStyle/>
-          <a:p>
-            <a:fld id="{63B2D7EC-928D-0645-AAE8-498D7443D60E}" type="slidenum">
-              <a:rPr lang="en-US" smtClean="0"/>
-              <a:t>3</a:t>
-            </a:fld>
-            <a:endParaRPr lang="en-US"/>
-          </a:p>
-        </p:txBody>
-      </p:sp>
-    </p:spTree>
-    <p:extLst>
-      <p:ext uri="{BB962C8B-B14F-4D97-AF65-F5344CB8AC3E}">
         <p14:creationId xmlns:p14="http://schemas.microsoft.com/office/powerpoint/2010/main" val="4160022392"/>
       </p:ext>
     </p:extLst>
@@ -1532,265 +1442,6 @@
           <a:p>
             <a:r>
               <a:rPr lang="en-US" dirty="0"/>
-              <a:t>Final Project Group Logistics</a:t>
-            </a:r>
-          </a:p>
-          <a:p>
-            <a:r>
-              <a:rPr lang="en-US" dirty="0"/>
-              <a:t>Section 6</a:t>
-            </a:r>
-          </a:p>
-        </p:txBody>
-      </p:sp>
-      <p:pic>
-        <p:nvPicPr>
-          <p:cNvPr id="4" name="Picture 3"/>
-          <p:cNvPicPr>
-            <a:picLocks noChangeAspect="1"/>
-          </p:cNvPicPr>
-          <p:nvPr/>
-        </p:nvPicPr>
-        <p:blipFill>
-          <a:blip r:embed="rId3"/>
-          <a:stretch>
-            <a:fillRect/>
-          </a:stretch>
-        </p:blipFill>
-        <p:spPr>
-          <a:xfrm>
-            <a:off x="0" y="5687942"/>
-            <a:ext cx="12192000" cy="1170058"/>
-          </a:xfrm>
-          <a:prstGeom prst="rect">
-            <a:avLst/>
-          </a:prstGeom>
-        </p:spPr>
-      </p:pic>
-    </p:spTree>
-    <p:extLst>
-      <p:ext uri="{BB962C8B-B14F-4D97-AF65-F5344CB8AC3E}">
-        <p14:creationId xmlns:p14="http://schemas.microsoft.com/office/powerpoint/2010/main" val="2309301937"/>
-      </p:ext>
-    </p:extLst>
-  </p:cSld>
-  <p:clrMapOvr>
-    <a:masterClrMapping/>
-  </p:clrMapOvr>
-</p:sld>
-</file>
-
-<file path=ppt/slides/slide2.xml><?xml version="1.0" encoding="utf-8"?>
-<p:sld xmlns:a="http://schemas.openxmlformats.org/drawingml/2006/main" xmlns:r="http://schemas.openxmlformats.org/officeDocument/2006/relationships" xmlns:p="http://schemas.openxmlformats.org/presentationml/2006/main">
-  <p:cSld>
-    <p:spTree>
-      <p:nvGrpSpPr>
-        <p:cNvPr id="1" name=""/>
-        <p:cNvGrpSpPr/>
-        <p:nvPr/>
-      </p:nvGrpSpPr>
-      <p:grpSpPr>
-        <a:xfrm>
-          <a:off x="0" y="0"/>
-          <a:ext cx="0" cy="0"/>
-          <a:chOff x="0" y="0"/>
-          <a:chExt cx="0" cy="0"/>
-        </a:xfrm>
-      </p:grpSpPr>
-      <p:sp>
-        <p:nvSpPr>
-          <p:cNvPr id="2" name="Title 1">
-            <a:extLst>
-              <a:ext uri="{FF2B5EF4-FFF2-40B4-BE49-F238E27FC236}">
-                <a16:creationId xmlns:a16="http://schemas.microsoft.com/office/drawing/2014/main" id="{D9A2FC35-5277-194E-AB7E-FD89FD4980F2}"/>
-              </a:ext>
-            </a:extLst>
-          </p:cNvPr>
-          <p:cNvSpPr>
-            <a:spLocks noGrp="1"/>
-          </p:cNvSpPr>
-          <p:nvPr>
-            <p:ph type="title"/>
-          </p:nvPr>
-        </p:nvSpPr>
-        <p:spPr/>
-        <p:txBody>
-          <a:bodyPr/>
-          <a:lstStyle/>
-          <a:p>
-            <a:r>
-              <a:rPr lang="en-US" dirty="0"/>
-              <a:t>Final Project Group Logistics</a:t>
-            </a:r>
-          </a:p>
-        </p:txBody>
-      </p:sp>
-      <p:sp>
-        <p:nvSpPr>
-          <p:cNvPr id="3" name="Content Placeholder 2">
-            <a:extLst>
-              <a:ext uri="{FF2B5EF4-FFF2-40B4-BE49-F238E27FC236}">
-                <a16:creationId xmlns:a16="http://schemas.microsoft.com/office/drawing/2014/main" id="{291E3AF2-C099-E246-BC2E-DBBADE5D07DE}"/>
-              </a:ext>
-            </a:extLst>
-          </p:cNvPr>
-          <p:cNvSpPr>
-            <a:spLocks noGrp="1"/>
-          </p:cNvSpPr>
-          <p:nvPr>
-            <p:ph idx="1"/>
-          </p:nvPr>
-        </p:nvSpPr>
-        <p:spPr/>
-        <p:txBody>
-          <a:bodyPr>
-            <a:normAutofit/>
-          </a:bodyPr>
-          <a:lstStyle/>
-          <a:p>
-            <a:r>
-              <a:rPr lang="en-US" dirty="0"/>
-              <a:t>You need to have finalized your groups of 3-4 for the final project.</a:t>
-            </a:r>
-          </a:p>
-          <a:p>
-            <a:endParaRPr lang="en-US" dirty="0"/>
-          </a:p>
-          <a:p>
-            <a:r>
-              <a:rPr lang="en-US" dirty="0"/>
-              <a:t>They do not have to be in your section.</a:t>
-            </a:r>
-          </a:p>
-          <a:p>
-            <a:r>
-              <a:rPr lang="en-US" dirty="0"/>
-              <a:t>They do not have to be in the same course code.</a:t>
-            </a:r>
-          </a:p>
-          <a:p>
-            <a:r>
-              <a:rPr lang="en-US" dirty="0"/>
-              <a:t>Place your information in the signup sheet if you haven’t!</a:t>
-            </a:r>
-          </a:p>
-          <a:p>
-            <a:pPr lvl="1"/>
-            <a:r>
-              <a:rPr lang="en-US" dirty="0"/>
-              <a:t>Email Toki and myself if you haven’t received your </a:t>
-            </a:r>
-            <a:r>
-              <a:rPr lang="en-US" dirty="0" err="1"/>
-              <a:t>Genbu</a:t>
-            </a:r>
-            <a:r>
-              <a:rPr lang="en-US" dirty="0"/>
-              <a:t> login details yet!</a:t>
-            </a:r>
-          </a:p>
-        </p:txBody>
-      </p:sp>
-      <p:sp>
-        <p:nvSpPr>
-          <p:cNvPr id="4" name="Slide Number Placeholder 3">
-            <a:extLst>
-              <a:ext uri="{FF2B5EF4-FFF2-40B4-BE49-F238E27FC236}">
-                <a16:creationId xmlns:a16="http://schemas.microsoft.com/office/drawing/2014/main" id="{4B1BE289-BC67-6C4B-989E-AF299F1F072E}"/>
-              </a:ext>
-            </a:extLst>
-          </p:cNvPr>
-          <p:cNvSpPr>
-            <a:spLocks noGrp="1"/>
-          </p:cNvSpPr>
-          <p:nvPr>
-            <p:ph type="sldNum" sz="quarter" idx="12"/>
-          </p:nvPr>
-        </p:nvSpPr>
-        <p:spPr/>
-        <p:txBody>
-          <a:bodyPr/>
-          <a:lstStyle/>
-          <a:p>
-            <a:fld id="{8AA1F273-EF2F-3941-BBF8-D365CB27DD6A}" type="slidenum">
-              <a:rPr lang="en-US" smtClean="0"/>
-              <a:t>2</a:t>
-            </a:fld>
-            <a:endParaRPr lang="en-US" dirty="0"/>
-          </a:p>
-        </p:txBody>
-      </p:sp>
-    </p:spTree>
-    <p:extLst>
-      <p:ext uri="{BB962C8B-B14F-4D97-AF65-F5344CB8AC3E}">
-        <p14:creationId xmlns:p14="http://schemas.microsoft.com/office/powerpoint/2010/main" val="2773246116"/>
-      </p:ext>
-    </p:extLst>
-  </p:cSld>
-  <p:clrMapOvr>
-    <a:masterClrMapping/>
-  </p:clrMapOvr>
-</p:sld>
-</file>
-
-<file path=ppt/slides/slide3.xml><?xml version="1.0" encoding="utf-8"?>
-<p:sld xmlns:a="http://schemas.openxmlformats.org/drawingml/2006/main" xmlns:r="http://schemas.openxmlformats.org/officeDocument/2006/relationships" xmlns:p="http://schemas.openxmlformats.org/presentationml/2006/main">
-  <p:cSld>
-    <p:spTree>
-      <p:nvGrpSpPr>
-        <p:cNvPr id="1" name=""/>
-        <p:cNvGrpSpPr/>
-        <p:nvPr/>
-      </p:nvGrpSpPr>
-      <p:grpSpPr>
-        <a:xfrm>
-          <a:off x="0" y="0"/>
-          <a:ext cx="0" cy="0"/>
-          <a:chOff x="0" y="0"/>
-          <a:chExt cx="0" cy="0"/>
-        </a:xfrm>
-      </p:grpSpPr>
-      <p:sp>
-        <p:nvSpPr>
-          <p:cNvPr id="2" name="Title 1"/>
-          <p:cNvSpPr>
-            <a:spLocks noGrp="1"/>
-          </p:cNvSpPr>
-          <p:nvPr>
-            <p:ph type="ctrTitle"/>
-          </p:nvPr>
-        </p:nvSpPr>
-        <p:spPr/>
-        <p:txBody>
-          <a:bodyPr>
-            <a:normAutofit/>
-          </a:bodyPr>
-          <a:lstStyle/>
-          <a:p>
-            <a:r>
-              <a:rPr lang="en-US" sz="5400" dirty="0"/>
-              <a:t>Principles of Robot Autonomy I</a:t>
-            </a:r>
-          </a:p>
-        </p:txBody>
-      </p:sp>
-      <p:sp>
-        <p:nvSpPr>
-          <p:cNvPr id="3" name="Subtitle 2"/>
-          <p:cNvSpPr>
-            <a:spLocks noGrp="1"/>
-          </p:cNvSpPr>
-          <p:nvPr>
-            <p:ph type="subTitle" idx="1"/>
-          </p:nvPr>
-        </p:nvSpPr>
-        <p:spPr/>
-        <p:txBody>
-          <a:bodyPr/>
-          <a:lstStyle/>
-          <a:p>
-            <a:r>
-              <a:rPr lang="en-US" dirty="0"/>
               <a:t>Section 6: Continuing Section 5 and </a:t>
             </a:r>
             <a:r>
@@ -1841,7 +1492,7 @@
 </p:sld>
 </file>
 
-<file path=ppt/slides/slide4.xml><?xml version="1.0" encoding="utf-8"?>
+<file path=ppt/slides/slide2.xml><?xml version="1.0" encoding="utf-8"?>
 <p:sld xmlns:a="http://schemas.openxmlformats.org/drawingml/2006/main" xmlns:r="http://schemas.openxmlformats.org/officeDocument/2006/relationships" xmlns:p="http://schemas.openxmlformats.org/presentationml/2006/main">
   <p:cSld>
     <p:spTree>
@@ -1965,7 +1616,7 @@
           <a:p>
             <a:fld id="{8AA1F273-EF2F-3941-BBF8-D365CB27DD6A}" type="slidenum">
               <a:rPr lang="en-US" smtClean="0"/>
-              <a:t>4</a:t>
+              <a:t>2</a:t>
             </a:fld>
             <a:endParaRPr lang="en-US"/>
           </a:p>
@@ -1984,7 +1635,7 @@
 </p:sld>
 </file>
 
-<file path=ppt/slides/slide5.xml><?xml version="1.0" encoding="utf-8"?>
+<file path=ppt/slides/slide3.xml><?xml version="1.0" encoding="utf-8"?>
 <p:sld xmlns:a="http://schemas.openxmlformats.org/drawingml/2006/main" xmlns:r="http://schemas.openxmlformats.org/officeDocument/2006/relationships" xmlns:p="http://schemas.openxmlformats.org/presentationml/2006/main">
   <p:cSld>
     <p:spTree>
@@ -2133,7 +1784,7 @@
           <a:p>
             <a:fld id="{8AA1F273-EF2F-3941-BBF8-D365CB27DD6A}" type="slidenum">
               <a:rPr lang="en-US" smtClean="0"/>
-              <a:t>5</a:t>
+              <a:t>3</a:t>
             </a:fld>
             <a:endParaRPr lang="en-US"/>
           </a:p>
@@ -2143,135 +1794,6 @@
     <p:extLst>
       <p:ext uri="{BB962C8B-B14F-4D97-AF65-F5344CB8AC3E}">
         <p14:creationId xmlns:p14="http://schemas.microsoft.com/office/powerpoint/2010/main" val="2056192425"/>
-      </p:ext>
-    </p:extLst>
-  </p:cSld>
-  <p:clrMapOvr>
-    <a:masterClrMapping/>
-  </p:clrMapOvr>
-</p:sld>
-</file>
-
-<file path=ppt/slides/slide6.xml><?xml version="1.0" encoding="utf-8"?>
-<p:sld xmlns:a="http://schemas.openxmlformats.org/drawingml/2006/main" xmlns:r="http://schemas.openxmlformats.org/officeDocument/2006/relationships" xmlns:p="http://schemas.openxmlformats.org/presentationml/2006/main">
-  <p:cSld>
-    <p:spTree>
-      <p:nvGrpSpPr>
-        <p:cNvPr id="1" name=""/>
-        <p:cNvGrpSpPr/>
-        <p:nvPr/>
-      </p:nvGrpSpPr>
-      <p:grpSpPr>
-        <a:xfrm>
-          <a:off x="0" y="0"/>
-          <a:ext cx="0" cy="0"/>
-          <a:chOff x="0" y="0"/>
-          <a:chExt cx="0" cy="0"/>
-        </a:xfrm>
-      </p:grpSpPr>
-      <p:sp>
-        <p:nvSpPr>
-          <p:cNvPr id="2" name="Title 1">
-            <a:extLst>
-              <a:ext uri="{FF2B5EF4-FFF2-40B4-BE49-F238E27FC236}">
-                <a16:creationId xmlns:a16="http://schemas.microsoft.com/office/drawing/2014/main" id="{6777F7BA-7EFA-9C42-BE47-E7A74C3DC394}"/>
-              </a:ext>
-            </a:extLst>
-          </p:cNvPr>
-          <p:cNvSpPr>
-            <a:spLocks noGrp="1"/>
-          </p:cNvSpPr>
-          <p:nvPr>
-            <p:ph type="title"/>
-          </p:nvPr>
-        </p:nvSpPr>
-        <p:spPr/>
-        <p:txBody>
-          <a:bodyPr/>
-          <a:lstStyle/>
-          <a:p>
-            <a:r>
-              <a:rPr lang="en-US" dirty="0"/>
-              <a:t>Section 6</a:t>
-            </a:r>
-          </a:p>
-        </p:txBody>
-      </p:sp>
-      <p:sp>
-        <p:nvSpPr>
-          <p:cNvPr id="3" name="Content Placeholder 2">
-            <a:extLst>
-              <a:ext uri="{FF2B5EF4-FFF2-40B4-BE49-F238E27FC236}">
-                <a16:creationId xmlns:a16="http://schemas.microsoft.com/office/drawing/2014/main" id="{58FBC2E3-DDA0-F84E-976A-A0D0996505A2}"/>
-              </a:ext>
-            </a:extLst>
-          </p:cNvPr>
-          <p:cNvSpPr>
-            <a:spLocks noGrp="1"/>
-          </p:cNvSpPr>
-          <p:nvPr>
-            <p:ph idx="1"/>
-          </p:nvPr>
-        </p:nvSpPr>
-        <p:spPr/>
-        <p:txBody>
-          <a:bodyPr/>
-          <a:lstStyle/>
-          <a:p>
-            <a:r>
-              <a:rPr lang="en-US" dirty="0"/>
-              <a:t>Focuses on getting you caught up from last section</a:t>
-            </a:r>
-          </a:p>
-          <a:p>
-            <a:r>
-              <a:rPr lang="en-US" dirty="0"/>
-              <a:t>Introduces you to </a:t>
-            </a:r>
-            <a:r>
-              <a:rPr lang="en-US" dirty="0" err="1"/>
-              <a:t>rosbag</a:t>
-            </a:r>
-            <a:r>
-              <a:rPr lang="en-US" dirty="0"/>
-              <a:t>, a useful post-hoc debugging and analysis tool.</a:t>
-            </a:r>
-          </a:p>
-        </p:txBody>
-      </p:sp>
-      <p:sp>
-        <p:nvSpPr>
-          <p:cNvPr id="4" name="Slide Number Placeholder 3">
-            <a:extLst>
-              <a:ext uri="{FF2B5EF4-FFF2-40B4-BE49-F238E27FC236}">
-                <a16:creationId xmlns:a16="http://schemas.microsoft.com/office/drawing/2014/main" id="{A27E5013-B4AA-FB4B-9CBA-7478F70749B9}"/>
-              </a:ext>
-            </a:extLst>
-          </p:cNvPr>
-          <p:cNvSpPr>
-            <a:spLocks noGrp="1"/>
-          </p:cNvSpPr>
-          <p:nvPr>
-            <p:ph type="sldNum" sz="quarter" idx="12"/>
-          </p:nvPr>
-        </p:nvSpPr>
-        <p:spPr/>
-        <p:txBody>
-          <a:bodyPr/>
-          <a:lstStyle/>
-          <a:p>
-            <a:fld id="{8AA1F273-EF2F-3941-BBF8-D365CB27DD6A}" type="slidenum">
-              <a:rPr lang="en-US" smtClean="0"/>
-              <a:t>6</a:t>
-            </a:fld>
-            <a:endParaRPr lang="en-US"/>
-          </a:p>
-        </p:txBody>
-      </p:sp>
-    </p:spTree>
-    <p:extLst>
-      <p:ext uri="{BB962C8B-B14F-4D97-AF65-F5344CB8AC3E}">
-        <p14:creationId xmlns:p14="http://schemas.microsoft.com/office/powerpoint/2010/main" val="739254115"/>
       </p:ext>
     </p:extLst>
   </p:cSld>

</xml_diff>